<commit_message>
Desenho de solução de software
</commit_message>
<xml_diff>
--- a/SPRINT2/EntregávelContainer(Verificar).pptx
+++ b/SPRINT2/EntregávelContainer(Verificar).pptx
@@ -6598,7 +6598,7 @@
           <a:p>
             <a:fld id="{59DFAF6B-3E96-4408-B623-B0A75E7457D9}" type="datetimeFigureOut">
               <a:rPr lang="en-US" smtClean="0"/>
-              <a:t>4/9/2022</a:t>
+              <a:t>4/11/2022</a:t>
             </a:fld>
             <a:endParaRPr lang="en-US"/>
           </a:p>
@@ -17074,6 +17074,127 @@
           <a:chExt cx="0" cy="0"/>
         </a:xfrm>
       </p:grpSpPr>
+      <p:grpSp>
+        <p:nvGrpSpPr>
+          <p:cNvPr id="10" name="Agrupar 9">
+            <a:extLst>
+              <a:ext uri="{FF2B5EF4-FFF2-40B4-BE49-F238E27FC236}">
+                <a16:creationId xmlns:a16="http://schemas.microsoft.com/office/drawing/2014/main" id="{05DE225B-EC55-4C0C-AA78-6C7050EEA476}"/>
+              </a:ext>
+            </a:extLst>
+          </p:cNvPr>
+          <p:cNvGrpSpPr/>
+          <p:nvPr/>
+        </p:nvGrpSpPr>
+        <p:grpSpPr>
+          <a:xfrm>
+            <a:off x="3537492" y="4211295"/>
+            <a:ext cx="2327633" cy="1828601"/>
+            <a:chOff x="1275591" y="1284407"/>
+            <a:chExt cx="2327633" cy="1828601"/>
+          </a:xfrm>
+        </p:grpSpPr>
+        <p:sp>
+          <p:nvSpPr>
+            <p:cNvPr id="99" name="Retângulo 29">
+              <a:extLst>
+                <a:ext uri="{FF2B5EF4-FFF2-40B4-BE49-F238E27FC236}">
+                  <a16:creationId xmlns:a16="http://schemas.microsoft.com/office/drawing/2014/main" id="{812A4F02-ADAF-724E-8E17-4424186A77BC}"/>
+                </a:ext>
+              </a:extLst>
+            </p:cNvPr>
+            <p:cNvSpPr/>
+            <p:nvPr/>
+          </p:nvSpPr>
+          <p:spPr>
+            <a:xfrm>
+              <a:off x="1298074" y="1284407"/>
+              <a:ext cx="2156068" cy="1828601"/>
+            </a:xfrm>
+            <a:prstGeom prst="rect">
+              <a:avLst/>
+            </a:prstGeom>
+            <a:solidFill>
+              <a:schemeClr val="bg1">
+                <a:lumMod val="85000"/>
+              </a:schemeClr>
+            </a:solidFill>
+            <a:ln>
+              <a:solidFill>
+                <a:srgbClr val="253746"/>
+              </a:solidFill>
+              <a:prstDash val="dash"/>
+            </a:ln>
+          </p:spPr>
+          <p:style>
+            <a:lnRef idx="2">
+              <a:schemeClr val="accent1">
+                <a:shade val="50000"/>
+              </a:schemeClr>
+            </a:lnRef>
+            <a:fillRef idx="1">
+              <a:schemeClr val="accent1"/>
+            </a:fillRef>
+            <a:effectRef idx="0">
+              <a:schemeClr val="accent1"/>
+            </a:effectRef>
+            <a:fontRef idx="minor">
+              <a:schemeClr val="lt1"/>
+            </a:fontRef>
+          </p:style>
+          <p:txBody>
+            <a:bodyPr rtlCol="0" anchor="ctr"/>
+            <a:lstStyle/>
+            <a:p>
+              <a:pPr algn="ctr"/>
+              <a:endParaRPr lang="pt-BR" sz="1632" dirty="0">
+                <a:solidFill>
+                  <a:prstClr val="white"/>
+                </a:solidFill>
+                <a:latin typeface="Calibri"/>
+              </a:endParaRPr>
+            </a:p>
+          </p:txBody>
+        </p:sp>
+        <p:sp>
+          <p:nvSpPr>
+            <p:cNvPr id="81" name="Retângulo 20">
+              <a:extLst>
+                <a:ext uri="{FF2B5EF4-FFF2-40B4-BE49-F238E27FC236}">
+                  <a16:creationId xmlns:a16="http://schemas.microsoft.com/office/drawing/2014/main" id="{7BC765A6-C83E-4480-8AF4-698BF45835D1}"/>
+                </a:ext>
+              </a:extLst>
+            </p:cNvPr>
+            <p:cNvSpPr/>
+            <p:nvPr/>
+          </p:nvSpPr>
+          <p:spPr>
+            <a:xfrm>
+              <a:off x="1275591" y="2250922"/>
+              <a:ext cx="2327633" cy="538865"/>
+            </a:xfrm>
+            <a:prstGeom prst="rect">
+              <a:avLst/>
+            </a:prstGeom>
+          </p:spPr>
+          <p:txBody>
+            <a:bodyPr wrap="square">
+              <a:spAutoFit/>
+            </a:bodyPr>
+            <a:lstStyle/>
+            <a:p>
+              <a:pPr lvl="0" algn="ctr">
+                <a:defRPr/>
+              </a:pPr>
+              <a:r>
+                <a:rPr lang="pt-BR" sz="1451" dirty="0"/>
+                <a:t>APIs para criação de boletos.</a:t>
+              </a:r>
+              <a:endParaRPr lang="pt-BR" sz="1088" dirty="0"/>
+            </a:p>
+          </p:txBody>
+        </p:sp>
+      </p:grpSp>
       <p:sp>
         <p:nvSpPr>
           <p:cNvPr id="3" name="Espaço Reservado para Número de Slide 2"/>
@@ -17086,7 +17207,7 @@
         </p:nvSpPr>
         <p:spPr>
           <a:xfrm>
-            <a:off x="11620500" y="6564313"/>
+            <a:off x="10225809" y="6518131"/>
             <a:ext cx="571500" cy="193675"/>
           </a:xfrm>
           <a:prstGeom prst="rect">
@@ -17139,7 +17260,7 @@
             </a:pPr>
             <a:r>
               <a:rPr lang="pt-BR" dirty="0"/>
-              <a:t>Diagrama – Visão – Containers – Exemplo para Uso</a:t>
+              <a:t>Diagrama – Visão </a:t>
             </a:r>
           </a:p>
         </p:txBody>
@@ -17158,7 +17279,7 @@
         </p:nvSpPr>
         <p:spPr>
           <a:xfrm>
-            <a:off x="4000027" y="1284405"/>
+            <a:off x="2605336" y="1238223"/>
             <a:ext cx="2131712" cy="1828602"/>
           </a:xfrm>
           <a:prstGeom prst="flowChartMagneticDisk">
@@ -17222,7 +17343,7 @@
         </p:nvCxnSpPr>
         <p:spPr>
           <a:xfrm flipH="1">
-            <a:off x="6131739" y="2186379"/>
+            <a:off x="4737048" y="2140197"/>
             <a:ext cx="1697335" cy="12327"/>
           </a:xfrm>
           <a:prstGeom prst="straightConnector1">
@@ -17268,7 +17389,7 @@
         </p:nvGrpSpPr>
         <p:grpSpPr>
           <a:xfrm>
-            <a:off x="7549720" y="949142"/>
+            <a:off x="6155029" y="902960"/>
             <a:ext cx="3055724" cy="2222927"/>
             <a:chOff x="8615898" y="1066468"/>
             <a:chExt cx="3369252" cy="2451008"/>
@@ -17463,7 +17584,7 @@
         </p:nvGrpSpPr>
         <p:grpSpPr>
           <a:xfrm>
-            <a:off x="7622087" y="4149235"/>
+            <a:off x="6583503" y="4159288"/>
             <a:ext cx="2425650" cy="1828603"/>
             <a:chOff x="7014179" y="4654462"/>
             <a:chExt cx="2674531" cy="2016225"/>
@@ -17541,7 +17662,7 @@
               <a:lstStyle/>
               <a:p>
                 <a:pPr algn="ctr"/>
-                <a:endParaRPr lang="pt-BR" sz="1632">
+                <a:endParaRPr lang="pt-BR" sz="1632" dirty="0">
                   <a:solidFill>
                     <a:prstClr val="white"/>
                   </a:solidFill>
@@ -17884,282 +18005,12 @@
                     <a:prstClr val="white"/>
                   </a:solidFill>
                 </a:rPr>
-                <a:t>Site para alugar  imóveis,</a:t>
+                <a:t>Site para alugar, imóveis</a:t>
               </a:r>
             </a:p>
           </p:txBody>
         </p:sp>
       </p:grpSp>
-      <p:grpSp>
-        <p:nvGrpSpPr>
-          <p:cNvPr id="80" name="Group 79">
-            <a:extLst>
-              <a:ext uri="{FF2B5EF4-FFF2-40B4-BE49-F238E27FC236}">
-                <a16:creationId xmlns:a16="http://schemas.microsoft.com/office/drawing/2014/main" id="{2C0B120C-5055-9C48-8CCB-F549F2BF42E9}"/>
-              </a:ext>
-            </a:extLst>
-          </p:cNvPr>
-          <p:cNvGrpSpPr/>
-          <p:nvPr/>
-        </p:nvGrpSpPr>
-        <p:grpSpPr>
-          <a:xfrm>
-            <a:off x="1312963" y="4220614"/>
-            <a:ext cx="2481674" cy="1828602"/>
-            <a:chOff x="3193083" y="4654463"/>
-            <a:chExt cx="2736304" cy="2016224"/>
-          </a:xfrm>
-        </p:grpSpPr>
-        <p:sp>
-          <p:nvSpPr>
-            <p:cNvPr id="7" name="Retângulo 6">
-              <a:extLst>
-                <a:ext uri="{FF2B5EF4-FFF2-40B4-BE49-F238E27FC236}">
-                  <a16:creationId xmlns:a16="http://schemas.microsoft.com/office/drawing/2014/main" id="{A180D8DE-BF4D-4A27-9E30-DEBFF7B84606}"/>
-                </a:ext>
-              </a:extLst>
-            </p:cNvPr>
-            <p:cNvSpPr/>
-            <p:nvPr/>
-          </p:nvSpPr>
-          <p:spPr>
-            <a:xfrm>
-              <a:off x="3218913" y="4654463"/>
-              <a:ext cx="2710474" cy="2016224"/>
-            </a:xfrm>
-            <a:prstGeom prst="rect">
-              <a:avLst/>
-            </a:prstGeom>
-            <a:solidFill>
-              <a:srgbClr val="32B9CD"/>
-            </a:solidFill>
-            <a:ln w="57150">
-              <a:noFill/>
-            </a:ln>
-          </p:spPr>
-          <p:style>
-            <a:lnRef idx="2">
-              <a:schemeClr val="accent1">
-                <a:shade val="50000"/>
-              </a:schemeClr>
-            </a:lnRef>
-            <a:fillRef idx="1">
-              <a:schemeClr val="accent1"/>
-            </a:fillRef>
-            <a:effectRef idx="0">
-              <a:schemeClr val="accent1"/>
-            </a:effectRef>
-            <a:fontRef idx="minor">
-              <a:schemeClr val="lt1"/>
-            </a:fontRef>
-          </p:style>
-          <p:txBody>
-            <a:bodyPr rtlCol="0" anchor="ctr"/>
-            <a:lstStyle/>
-            <a:p>
-              <a:pPr algn="ctr"/>
-              <a:endParaRPr lang="pt-BR" sz="1632" dirty="0">
-                <a:solidFill>
-                  <a:prstClr val="white"/>
-                </a:solidFill>
-                <a:latin typeface="Calibri"/>
-              </a:endParaRPr>
-            </a:p>
-          </p:txBody>
-        </p:sp>
-        <p:sp>
-          <p:nvSpPr>
-            <p:cNvPr id="8" name="Retângulo 7">
-              <a:extLst>
-                <a:ext uri="{FF2B5EF4-FFF2-40B4-BE49-F238E27FC236}">
-                  <a16:creationId xmlns:a16="http://schemas.microsoft.com/office/drawing/2014/main" id="{134A1387-23C1-45FA-9D89-C832D3573B96}"/>
-                </a:ext>
-              </a:extLst>
-            </p:cNvPr>
-            <p:cNvSpPr/>
-            <p:nvPr/>
-          </p:nvSpPr>
-          <p:spPr>
-            <a:xfrm>
-              <a:off x="3362930" y="5446551"/>
-              <a:ext cx="2278424" cy="840330"/>
-            </a:xfrm>
-            <a:prstGeom prst="rect">
-              <a:avLst/>
-            </a:prstGeom>
-            <a:ln>
-              <a:noFill/>
-            </a:ln>
-          </p:spPr>
-          <p:txBody>
-            <a:bodyPr wrap="square">
-              <a:spAutoFit/>
-            </a:bodyPr>
-            <a:lstStyle/>
-            <a:p>
-              <a:pPr lvl="0" algn="ctr">
-                <a:defRPr/>
-              </a:pPr>
-              <a:r>
-                <a:rPr lang="pt-BR" sz="1451" b="1" dirty="0">
-                  <a:solidFill>
-                    <a:prstClr val="white"/>
-                  </a:solidFill>
-                </a:rPr>
-                <a:t>Parte que recebe as informações dos boletos</a:t>
-              </a:r>
-              <a:endParaRPr lang="pt-BR" sz="1451" dirty="0">
-                <a:solidFill>
-                  <a:prstClr val="white"/>
-                </a:solidFill>
-              </a:endParaRPr>
-            </a:p>
-          </p:txBody>
-        </p:sp>
-        <p:sp>
-          <p:nvSpPr>
-            <p:cNvPr id="66" name="Retângulo 20">
-              <a:extLst>
-                <a:ext uri="{FF2B5EF4-FFF2-40B4-BE49-F238E27FC236}">
-                  <a16:creationId xmlns:a16="http://schemas.microsoft.com/office/drawing/2014/main" id="{6AA9910F-E6AC-8049-8342-23B35B2B59B8}"/>
-                </a:ext>
-              </a:extLst>
-            </p:cNvPr>
-            <p:cNvSpPr/>
-            <p:nvPr/>
-          </p:nvSpPr>
-          <p:spPr>
-            <a:xfrm>
-              <a:off x="3193083" y="4711163"/>
-              <a:ext cx="2710474" cy="655805"/>
-            </a:xfrm>
-            <a:prstGeom prst="rect">
-              <a:avLst/>
-            </a:prstGeom>
-            <a:ln>
-              <a:noFill/>
-            </a:ln>
-          </p:spPr>
-          <p:txBody>
-            <a:bodyPr wrap="square">
-              <a:spAutoFit/>
-            </a:bodyPr>
-            <a:lstStyle/>
-            <a:p>
-              <a:pPr lvl="0" algn="ctr">
-                <a:defRPr/>
-              </a:pPr>
-              <a:r>
-                <a:rPr lang="pt-BR" sz="1814" b="1" dirty="0" err="1">
-                  <a:solidFill>
-                    <a:prstClr val="white"/>
-                  </a:solidFill>
-                </a:rPr>
-                <a:t>Client</a:t>
-              </a:r>
-              <a:r>
-                <a:rPr lang="pt-BR" sz="1814" b="1" dirty="0">
-                  <a:solidFill>
-                    <a:prstClr val="white"/>
-                  </a:solidFill>
-                </a:rPr>
-                <a:t> </a:t>
-              </a:r>
-              <a:r>
-                <a:rPr lang="pt-BR" sz="1814" b="1" dirty="0" err="1">
-                  <a:solidFill>
-                    <a:prstClr val="white"/>
-                  </a:solidFill>
-                </a:rPr>
-                <a:t>Side</a:t>
-              </a:r>
-              <a:r>
-                <a:rPr lang="pt-BR" sz="1814" b="1" dirty="0">
-                  <a:solidFill>
-                    <a:prstClr val="white"/>
-                  </a:solidFill>
-                </a:rPr>
-                <a:t> Desktop </a:t>
-              </a:r>
-            </a:p>
-            <a:p>
-              <a:pPr lvl="0" algn="ctr">
-                <a:defRPr/>
-              </a:pPr>
-              <a:r>
-                <a:rPr lang="pt-BR" sz="1451" dirty="0">
-                  <a:solidFill>
-                    <a:prstClr val="white"/>
-                  </a:solidFill>
-                </a:rPr>
-                <a:t>[Container:]</a:t>
-              </a:r>
-            </a:p>
-          </p:txBody>
-        </p:sp>
-      </p:grpSp>
-      <p:sp>
-        <p:nvSpPr>
-          <p:cNvPr id="99" name="Retângulo 29">
-            <a:extLst>
-              <a:ext uri="{FF2B5EF4-FFF2-40B4-BE49-F238E27FC236}">
-                <a16:creationId xmlns:a16="http://schemas.microsoft.com/office/drawing/2014/main" id="{812A4F02-ADAF-724E-8E17-4424186A77BC}"/>
-              </a:ext>
-            </a:extLst>
-          </p:cNvPr>
-          <p:cNvSpPr/>
-          <p:nvPr/>
-        </p:nvSpPr>
-        <p:spPr>
-          <a:xfrm>
-            <a:off x="1298074" y="1284407"/>
-            <a:ext cx="2156068" cy="1828601"/>
-          </a:xfrm>
-          <a:prstGeom prst="rect">
-            <a:avLst/>
-          </a:prstGeom>
-          <a:solidFill>
-            <a:schemeClr val="bg1">
-              <a:lumMod val="85000"/>
-            </a:schemeClr>
-          </a:solidFill>
-          <a:ln>
-            <a:solidFill>
-              <a:srgbClr val="253746"/>
-            </a:solidFill>
-            <a:prstDash val="dash"/>
-          </a:ln>
-        </p:spPr>
-        <p:style>
-          <a:lnRef idx="2">
-            <a:schemeClr val="accent1">
-              <a:shade val="50000"/>
-            </a:schemeClr>
-          </a:lnRef>
-          <a:fillRef idx="1">
-            <a:schemeClr val="accent1"/>
-          </a:fillRef>
-          <a:effectRef idx="0">
-            <a:schemeClr val="accent1"/>
-          </a:effectRef>
-          <a:fontRef idx="minor">
-            <a:schemeClr val="lt1"/>
-          </a:fontRef>
-        </p:style>
-        <p:txBody>
-          <a:bodyPr rtlCol="0" anchor="ctr"/>
-          <a:lstStyle/>
-          <a:p>
-            <a:pPr algn="ctr"/>
-            <a:endParaRPr lang="pt-BR" sz="1632" dirty="0">
-              <a:solidFill>
-                <a:prstClr val="white"/>
-              </a:solidFill>
-              <a:latin typeface="Calibri"/>
-            </a:endParaRPr>
-          </a:p>
-        </p:txBody>
-      </p:sp>
       <p:sp>
         <p:nvSpPr>
           <p:cNvPr id="100" name="Retângulo 20">
@@ -18174,7 +18025,7 @@
         </p:nvSpPr>
         <p:spPr>
           <a:xfrm>
-            <a:off x="3865804" y="1806863"/>
+            <a:off x="2471113" y="1760681"/>
             <a:ext cx="2327633" cy="594778"/>
           </a:xfrm>
           <a:prstGeom prst="rect">
@@ -18233,7 +18084,7 @@
         </p:nvSpPr>
         <p:spPr>
           <a:xfrm>
-            <a:off x="3911292" y="2396992"/>
+            <a:off x="2516601" y="2350810"/>
             <a:ext cx="2327633" cy="762132"/>
           </a:xfrm>
           <a:prstGeom prst="rect">
@@ -18255,23 +18106,7 @@
                   <a:prstClr val="white"/>
                 </a:solidFill>
               </a:rPr>
-              <a:t>Armazena os dados de clientes e dados de </a:t>
-            </a:r>
-            <a:r>
-              <a:rPr lang="pt-BR" sz="1451" dirty="0" err="1">
-                <a:solidFill>
-                  <a:prstClr val="white"/>
-                </a:solidFill>
-              </a:rPr>
-              <a:t>anuncios</a:t>
-            </a:r>
-            <a:r>
-              <a:rPr lang="pt-BR" sz="1451" dirty="0">
-                <a:solidFill>
-                  <a:prstClr val="white"/>
-                </a:solidFill>
-              </a:rPr>
-              <a:t>.</a:t>
+              <a:t>Armazena os dados de clientes e dados de anúncios.</a:t>
             </a:r>
             <a:endParaRPr lang="pt-BR" sz="1088" dirty="0">
               <a:solidFill>
@@ -18295,7 +18130,7 @@
         </p:nvSpPr>
         <p:spPr>
           <a:xfrm>
-            <a:off x="615968" y="1239019"/>
+            <a:off x="2936503" y="4308658"/>
             <a:ext cx="3403012" cy="556178"/>
           </a:xfrm>
           <a:prstGeom prst="rect">
@@ -18341,7 +18176,7 @@
         </p:nvSpPr>
         <p:spPr>
           <a:xfrm>
-            <a:off x="8089416" y="1592349"/>
+            <a:off x="6694725" y="1546167"/>
             <a:ext cx="2499945" cy="461665"/>
           </a:xfrm>
           <a:prstGeom prst="rect">
@@ -18427,57 +18262,9 @@
           <p:nvPr/>
         </p:nvCxnSpPr>
         <p:spPr>
-          <a:xfrm flipV="1">
-            <a:off x="8861699" y="3172069"/>
-            <a:ext cx="329319" cy="977166"/>
-          </a:xfrm>
-          <a:prstGeom prst="straightConnector1">
-            <a:avLst/>
-          </a:prstGeom>
-          <a:ln w="19050">
-            <a:solidFill>
-              <a:schemeClr val="accent5">
-                <a:lumMod val="75000"/>
-              </a:schemeClr>
-            </a:solidFill>
-            <a:prstDash val="sysDash"/>
-            <a:headEnd type="none" w="lg" len="lg"/>
-            <a:tailEnd type="triangle" w="lg" len="lg"/>
-          </a:ln>
-        </p:spPr>
-        <p:style>
-          <a:lnRef idx="1">
-            <a:schemeClr val="accent1"/>
-          </a:lnRef>
-          <a:fillRef idx="0">
-            <a:schemeClr val="accent1"/>
-          </a:fillRef>
-          <a:effectRef idx="0">
-            <a:schemeClr val="accent1"/>
-          </a:effectRef>
-          <a:fontRef idx="minor">
-            <a:schemeClr val="tx1"/>
-          </a:fontRef>
-        </p:style>
-      </p:cxnSp>
-      <p:cxnSp>
-        <p:nvCxnSpPr>
-          <p:cNvPr id="42" name="Conector de Seta Reta 41">
-            <a:extLst>
-              <a:ext uri="{FF2B5EF4-FFF2-40B4-BE49-F238E27FC236}">
-                <a16:creationId xmlns:a16="http://schemas.microsoft.com/office/drawing/2014/main" id="{12FB2862-B965-4A94-A00C-6853258FFC45}"/>
-              </a:ext>
-            </a:extLst>
-          </p:cNvPr>
-          <p:cNvCxnSpPr>
-            <a:cxnSpLocks/>
-          </p:cNvCxnSpPr>
-          <p:nvPr/>
-        </p:nvCxnSpPr>
-        <p:spPr>
-          <a:xfrm flipV="1">
-            <a:off x="3792865" y="2540865"/>
-            <a:ext cx="3963159" cy="1664605"/>
+          <a:xfrm flipH="1" flipV="1">
+            <a:off x="7796329" y="3125887"/>
+            <a:ext cx="26786" cy="1033401"/>
           </a:xfrm>
           <a:prstGeom prst="straightConnector1">
             <a:avLst/>
@@ -18519,14 +18306,14 @@
           </p:cNvPr>
           <p:cNvCxnSpPr>
             <a:cxnSpLocks/>
-            <a:endCxn id="7" idx="0"/>
+            <a:endCxn id="40" idx="1"/>
           </p:cNvCxnSpPr>
           <p:nvPr/>
         </p:nvCxnSpPr>
         <p:spPr>
-          <a:xfrm flipH="1">
-            <a:off x="2565513" y="3144560"/>
-            <a:ext cx="41576" cy="1076054"/>
+          <a:xfrm flipV="1">
+            <a:off x="5738526" y="5073590"/>
+            <a:ext cx="967559" cy="40566"/>
           </a:xfrm>
           <a:prstGeom prst="straightConnector1">
             <a:avLst/>
@@ -18557,44 +18344,102 @@
           </a:fontRef>
         </p:style>
       </p:cxnSp>
-      <p:sp>
-        <p:nvSpPr>
-          <p:cNvPr id="81" name="Retângulo 20">
+      <p:cxnSp>
+        <p:nvCxnSpPr>
+          <p:cNvPr id="31" name="Conector de Seta Reta 107">
             <a:extLst>
               <a:ext uri="{FF2B5EF4-FFF2-40B4-BE49-F238E27FC236}">
-                <a16:creationId xmlns:a16="http://schemas.microsoft.com/office/drawing/2014/main" id="{7BC765A6-C83E-4480-8AF4-698BF45835D1}"/>
+                <a16:creationId xmlns:a16="http://schemas.microsoft.com/office/drawing/2014/main" id="{E99FDC8F-7FD5-4624-A965-E2A09C249967}"/>
               </a:ext>
             </a:extLst>
           </p:cNvPr>
-          <p:cNvSpPr/>
+          <p:cNvCxnSpPr>
+            <a:cxnSpLocks/>
+          </p:cNvCxnSpPr>
           <p:nvPr/>
-        </p:nvSpPr>
+        </p:nvCxnSpPr>
         <p:spPr>
           <a:xfrm>
-            <a:off x="1275591" y="2250922"/>
-            <a:ext cx="2327633" cy="538865"/>
+            <a:off x="8285018" y="3163063"/>
+            <a:ext cx="0" cy="985159"/>
           </a:xfrm>
-          <a:prstGeom prst="rect">
+          <a:prstGeom prst="straightConnector1">
             <a:avLst/>
           </a:prstGeom>
+          <a:ln w="19050">
+            <a:solidFill>
+              <a:schemeClr val="accent5">
+                <a:lumMod val="75000"/>
+              </a:schemeClr>
+            </a:solidFill>
+            <a:prstDash val="sysDash"/>
+            <a:headEnd type="none" w="lg" len="lg"/>
+            <a:tailEnd type="triangle" w="lg" len="lg"/>
+          </a:ln>
         </p:spPr>
-        <p:txBody>
-          <a:bodyPr wrap="square">
-            <a:spAutoFit/>
-          </a:bodyPr>
-          <a:lstStyle/>
-          <a:p>
-            <a:pPr lvl="0" algn="ctr">
-              <a:defRPr/>
-            </a:pPr>
-            <a:r>
-              <a:rPr lang="pt-BR" sz="1451" dirty="0"/>
-              <a:t>APIs para criação de boletos.</a:t>
-            </a:r>
-            <a:endParaRPr lang="pt-BR" sz="1088" dirty="0"/>
-          </a:p>
-        </p:txBody>
-      </p:sp>
+        <p:style>
+          <a:lnRef idx="1">
+            <a:schemeClr val="accent1"/>
+          </a:lnRef>
+          <a:fillRef idx="0">
+            <a:schemeClr val="accent1"/>
+          </a:fillRef>
+          <a:effectRef idx="0">
+            <a:schemeClr val="accent1"/>
+          </a:effectRef>
+          <a:fontRef idx="minor">
+            <a:schemeClr val="tx1"/>
+          </a:fontRef>
+        </p:style>
+      </p:cxnSp>
+      <p:cxnSp>
+        <p:nvCxnSpPr>
+          <p:cNvPr id="43" name="Conector de Seta Reta 42">
+            <a:extLst>
+              <a:ext uri="{FF2B5EF4-FFF2-40B4-BE49-F238E27FC236}">
+                <a16:creationId xmlns:a16="http://schemas.microsoft.com/office/drawing/2014/main" id="{910C3ADD-79AA-4AD5-BFC5-9D0968E6B758}"/>
+              </a:ext>
+            </a:extLst>
+          </p:cNvPr>
+          <p:cNvCxnSpPr>
+            <a:cxnSpLocks/>
+          </p:cNvCxnSpPr>
+          <p:nvPr/>
+        </p:nvCxnSpPr>
+        <p:spPr>
+          <a:xfrm flipH="1" flipV="1">
+            <a:off x="5665994" y="5298016"/>
+            <a:ext cx="1066591" cy="24894"/>
+          </a:xfrm>
+          <a:prstGeom prst="straightConnector1">
+            <a:avLst/>
+          </a:prstGeom>
+          <a:ln w="19050">
+            <a:solidFill>
+              <a:schemeClr val="accent5">
+                <a:lumMod val="75000"/>
+              </a:schemeClr>
+            </a:solidFill>
+            <a:prstDash val="sysDash"/>
+            <a:headEnd type="none" w="lg" len="lg"/>
+            <a:tailEnd type="triangle" w="lg" len="lg"/>
+          </a:ln>
+        </p:spPr>
+        <p:style>
+          <a:lnRef idx="1">
+            <a:schemeClr val="accent1"/>
+          </a:lnRef>
+          <a:fillRef idx="0">
+            <a:schemeClr val="accent1"/>
+          </a:fillRef>
+          <a:effectRef idx="0">
+            <a:schemeClr val="accent1"/>
+          </a:effectRef>
+          <a:fontRef idx="minor">
+            <a:schemeClr val="tx1"/>
+          </a:fontRef>
+        </p:style>
+      </p:cxnSp>
     </p:spTree>
     <p:extLst>
       <p:ext uri="{BB962C8B-B14F-4D97-AF65-F5344CB8AC3E}">
@@ -19105,21 +18950,6 @@
 </file>
 
 <file path=customXml/item1.xml><?xml version="1.0" encoding="utf-8"?>
-<?mso-contentType ?>
-<FormTemplates xmlns="http://schemas.microsoft.com/sharepoint/v3/contenttype/forms">
-  <Display>DocumentLibraryForm</Display>
-  <Edit>DocumentLibraryForm</Edit>
-  <New>DocumentLibraryForm</New>
-</FormTemplates>
-</file>
-
-<file path=customXml/item2.xml><?xml version="1.0" encoding="utf-8"?>
-<p:properties xmlns:p="http://schemas.microsoft.com/office/2006/metadata/properties" xmlns:xsi="http://www.w3.org/2001/XMLSchema-instance" xmlns:pc="http://schemas.microsoft.com/office/infopath/2007/PartnerControls">
-  <documentManagement/>
-</p:properties>
-</file>
-
-<file path=customXml/item3.xml><?xml version="1.0" encoding="utf-8"?>
 <ct:contentTypeSchema xmlns:ct="http://schemas.microsoft.com/office/2006/metadata/contentType" xmlns:ma="http://schemas.microsoft.com/office/2006/metadata/properties/metaAttributes" ct:_="" ma:_="" ma:contentTypeName="Documento" ma:contentTypeID="0x010100A0731E8D1374834C8E89AE093B47FB16" ma:contentTypeVersion="4" ma:contentTypeDescription="Crie um novo documento." ma:contentTypeScope="" ma:versionID="4837e8b0590f4bdf6c36e45dd83967a9">
   <xsd:schema xmlns:xsd="http://www.w3.org/2001/XMLSchema" xmlns:xs="http://www.w3.org/2001/XMLSchema" xmlns:p="http://schemas.microsoft.com/office/2006/metadata/properties" xmlns:ns2="8d73c667-0e32-466c-9097-a1f484c201cc" targetNamespace="http://schemas.microsoft.com/office/2006/metadata/properties" ma:root="true" ma:fieldsID="2b1d107c167b6255f3e6c6b90367b717" ns2:_="">
     <xsd:import namespace="8d73c667-0e32-466c-9097-a1f484c201cc"/>
@@ -19265,10 +19095,35 @@
 </ct:contentTypeSchema>
 </file>
 
+<file path=customXml/item2.xml><?xml version="1.0" encoding="utf-8"?>
+<p:properties xmlns:p="http://schemas.microsoft.com/office/2006/metadata/properties" xmlns:xsi="http://www.w3.org/2001/XMLSchema-instance" xmlns:pc="http://schemas.microsoft.com/office/infopath/2007/PartnerControls">
+  <documentManagement/>
+</p:properties>
+</file>
+
+<file path=customXml/item3.xml><?xml version="1.0" encoding="utf-8"?>
+<?mso-contentType ?>
+<FormTemplates xmlns="http://schemas.microsoft.com/sharepoint/v3/contenttype/forms">
+  <Display>DocumentLibraryForm</Display>
+  <Edit>DocumentLibraryForm</Edit>
+  <New>DocumentLibraryForm</New>
+</FormTemplates>
+</file>
+
 <file path=customXml/itemProps1.xml><?xml version="1.0" encoding="utf-8"?>
-<ds:datastoreItem xmlns:ds="http://schemas.openxmlformats.org/officeDocument/2006/customXml" ds:itemID="{7B7E5500-1E1C-4DD3-A9B7-CDF199E77632}">
+<ds:datastoreItem xmlns:ds="http://schemas.openxmlformats.org/officeDocument/2006/customXml" ds:itemID="{C77A63D9-D020-4140-8B2F-EC8E663DD653}">
   <ds:schemaRefs>
-    <ds:schemaRef ds:uri="http://schemas.microsoft.com/sharepoint/v3/contenttype/forms"/>
+    <ds:schemaRef ds:uri="http://schemas.microsoft.com/office/2006/metadata/contentType"/>
+    <ds:schemaRef ds:uri="http://schemas.microsoft.com/office/2006/metadata/properties/metaAttributes"/>
+    <ds:schemaRef ds:uri="http://www.w3.org/2001/XMLSchema"/>
+    <ds:schemaRef ds:uri="http://schemas.microsoft.com/office/2006/metadata/properties"/>
+    <ds:schemaRef ds:uri="8d73c667-0e32-466c-9097-a1f484c201cc"/>
+    <ds:schemaRef ds:uri="http://schemas.microsoft.com/office/2006/documentManagement/types"/>
+    <ds:schemaRef ds:uri="http://schemas.microsoft.com/office/infopath/2007/PartnerControls"/>
+    <ds:schemaRef ds:uri="http://schemas.openxmlformats.org/package/2006/metadata/core-properties"/>
+    <ds:schemaRef ds:uri="http://purl.org/dc/elements/1.1/"/>
+    <ds:schemaRef ds:uri="http://purl.org/dc/terms/"/>
+    <ds:schemaRef ds:uri="http://schemas.microsoft.com/internal/obd"/>
   </ds:schemaRefs>
 </ds:datastoreItem>
 </file>
@@ -19290,19 +19145,9 @@
 </file>
 
 <file path=customXml/itemProps3.xml><?xml version="1.0" encoding="utf-8"?>
-<ds:datastoreItem xmlns:ds="http://schemas.openxmlformats.org/officeDocument/2006/customXml" ds:itemID="{C77A63D9-D020-4140-8B2F-EC8E663DD653}">
+<ds:datastoreItem xmlns:ds="http://schemas.openxmlformats.org/officeDocument/2006/customXml" ds:itemID="{7B7E5500-1E1C-4DD3-A9B7-CDF199E77632}">
   <ds:schemaRefs>
-    <ds:schemaRef ds:uri="http://schemas.microsoft.com/office/2006/metadata/contentType"/>
-    <ds:schemaRef ds:uri="http://schemas.microsoft.com/office/2006/metadata/properties/metaAttributes"/>
-    <ds:schemaRef ds:uri="http://www.w3.org/2001/XMLSchema"/>
-    <ds:schemaRef ds:uri="http://schemas.microsoft.com/office/2006/metadata/properties"/>
-    <ds:schemaRef ds:uri="8d73c667-0e32-466c-9097-a1f484c201cc"/>
-    <ds:schemaRef ds:uri="http://schemas.microsoft.com/office/2006/documentManagement/types"/>
-    <ds:schemaRef ds:uri="http://schemas.microsoft.com/office/infopath/2007/PartnerControls"/>
-    <ds:schemaRef ds:uri="http://schemas.openxmlformats.org/package/2006/metadata/core-properties"/>
-    <ds:schemaRef ds:uri="http://purl.org/dc/elements/1.1/"/>
-    <ds:schemaRef ds:uri="http://purl.org/dc/terms/"/>
-    <ds:schemaRef ds:uri="http://schemas.microsoft.com/internal/obd"/>
+    <ds:schemaRef ds:uri="http://schemas.microsoft.com/sharepoint/v3/contenttype/forms"/>
   </ds:schemaRefs>
 </ds:datastoreItem>
 </file>
</xml_diff>